<commit_message>
Adding some changes in the presentation and the README again
</commit_message>
<xml_diff>
--- a/presentation/CapstonProject.pptx
+++ b/presentation/CapstonProject.pptx
@@ -8,10 +8,14 @@
     <p:sldId id="256" r:id="rId2"/>
     <p:sldId id="257" r:id="rId3"/>
     <p:sldId id="258" r:id="rId4"/>
-    <p:sldId id="259" r:id="rId5"/>
-    <p:sldId id="260" r:id="rId6"/>
+    <p:sldId id="263" r:id="rId5"/>
+    <p:sldId id="259" r:id="rId6"/>
     <p:sldId id="261" r:id="rId7"/>
     <p:sldId id="262" r:id="rId8"/>
+    <p:sldId id="264" r:id="rId9"/>
+    <p:sldId id="265" r:id="rId10"/>
+    <p:sldId id="266" r:id="rId11"/>
+    <p:sldId id="267" r:id="rId12"/>
   </p:sldIdLst>
   <p:sldSz cx="12192000" cy="6858000"/>
   <p:notesSz cx="6858000" cy="9144000"/>
@@ -110,6 +114,11 @@
       </a:defRPr>
     </a:lvl9pPr>
   </p:defaultTextStyle>
+  <p:extLst>
+    <p:ext uri="{EFAFB233-063F-42B5-8137-9DF3F51BA10A}">
+      <p15:sldGuideLst xmlns:p15="http://schemas.microsoft.com/office/powerpoint/2012/main"/>
+    </p:ext>
+  </p:extLst>
 </p:presentation>
 </file>
 
@@ -262,7 +271,7 @@
           <a:p>
             <a:fld id="{DDBFD437-33C7-4B24-B6C7-F91A3EACF5E2}" type="datetimeFigureOut">
               <a:rPr lang="en-GB" smtClean="0"/>
-              <a:t>29/12/2025</a:t>
+              <a:t>30/12/2025</a:t>
             </a:fld>
             <a:endParaRPr lang="en-GB"/>
           </a:p>
@@ -462,7 +471,7 @@
           <a:p>
             <a:fld id="{DDBFD437-33C7-4B24-B6C7-F91A3EACF5E2}" type="datetimeFigureOut">
               <a:rPr lang="en-GB" smtClean="0"/>
-              <a:t>29/12/2025</a:t>
+              <a:t>30/12/2025</a:t>
             </a:fld>
             <a:endParaRPr lang="en-GB"/>
           </a:p>
@@ -672,7 +681,7 @@
           <a:p>
             <a:fld id="{DDBFD437-33C7-4B24-B6C7-F91A3EACF5E2}" type="datetimeFigureOut">
               <a:rPr lang="en-GB" smtClean="0"/>
-              <a:t>29/12/2025</a:t>
+              <a:t>30/12/2025</a:t>
             </a:fld>
             <a:endParaRPr lang="en-GB"/>
           </a:p>
@@ -872,7 +881,7 @@
           <a:p>
             <a:fld id="{DDBFD437-33C7-4B24-B6C7-F91A3EACF5E2}" type="datetimeFigureOut">
               <a:rPr lang="en-GB" smtClean="0"/>
-              <a:t>29/12/2025</a:t>
+              <a:t>30/12/2025</a:t>
             </a:fld>
             <a:endParaRPr lang="en-GB"/>
           </a:p>
@@ -1148,7 +1157,7 @@
           <a:p>
             <a:fld id="{DDBFD437-33C7-4B24-B6C7-F91A3EACF5E2}" type="datetimeFigureOut">
               <a:rPr lang="en-GB" smtClean="0"/>
-              <a:t>29/12/2025</a:t>
+              <a:t>30/12/2025</a:t>
             </a:fld>
             <a:endParaRPr lang="en-GB"/>
           </a:p>
@@ -1416,7 +1425,7 @@
           <a:p>
             <a:fld id="{DDBFD437-33C7-4B24-B6C7-F91A3EACF5E2}" type="datetimeFigureOut">
               <a:rPr lang="en-GB" smtClean="0"/>
-              <a:t>29/12/2025</a:t>
+              <a:t>30/12/2025</a:t>
             </a:fld>
             <a:endParaRPr lang="en-GB"/>
           </a:p>
@@ -1831,7 +1840,7 @@
           <a:p>
             <a:fld id="{DDBFD437-33C7-4B24-B6C7-F91A3EACF5E2}" type="datetimeFigureOut">
               <a:rPr lang="en-GB" smtClean="0"/>
-              <a:t>29/12/2025</a:t>
+              <a:t>30/12/2025</a:t>
             </a:fld>
             <a:endParaRPr lang="en-GB"/>
           </a:p>
@@ -1973,7 +1982,7 @@
           <a:p>
             <a:fld id="{DDBFD437-33C7-4B24-B6C7-F91A3EACF5E2}" type="datetimeFigureOut">
               <a:rPr lang="en-GB" smtClean="0"/>
-              <a:t>29/12/2025</a:t>
+              <a:t>30/12/2025</a:t>
             </a:fld>
             <a:endParaRPr lang="en-GB"/>
           </a:p>
@@ -2086,7 +2095,7 @@
           <a:p>
             <a:fld id="{DDBFD437-33C7-4B24-B6C7-F91A3EACF5E2}" type="datetimeFigureOut">
               <a:rPr lang="en-GB" smtClean="0"/>
-              <a:t>29/12/2025</a:t>
+              <a:t>30/12/2025</a:t>
             </a:fld>
             <a:endParaRPr lang="en-GB"/>
           </a:p>
@@ -2399,7 +2408,7 @@
           <a:p>
             <a:fld id="{DDBFD437-33C7-4B24-B6C7-F91A3EACF5E2}" type="datetimeFigureOut">
               <a:rPr lang="en-GB" smtClean="0"/>
-              <a:t>29/12/2025</a:t>
+              <a:t>30/12/2025</a:t>
             </a:fld>
             <a:endParaRPr lang="en-GB"/>
           </a:p>
@@ -2688,7 +2697,7 @@
           <a:p>
             <a:fld id="{DDBFD437-33C7-4B24-B6C7-F91A3EACF5E2}" type="datetimeFigureOut">
               <a:rPr lang="en-GB" smtClean="0"/>
-              <a:t>29/12/2025</a:t>
+              <a:t>30/12/2025</a:t>
             </a:fld>
             <a:endParaRPr lang="en-GB"/>
           </a:p>
@@ -2931,7 +2940,7 @@
           <a:p>
             <a:fld id="{DDBFD437-33C7-4B24-B6C7-F91A3EACF5E2}" type="datetimeFigureOut">
               <a:rPr lang="en-GB" smtClean="0"/>
-              <a:t>29/12/2025</a:t>
+              <a:t>30/12/2025</a:t>
             </a:fld>
             <a:endParaRPr lang="en-GB"/>
           </a:p>
@@ -3370,13 +3379,10 @@
           <a:lstStyle/>
           <a:p>
             <a:r>
-              <a:rPr lang="en-GB" dirty="0" err="1"/>
-              <a:t>Capston</a:t>
-            </a:r>
-            <a:r>
-              <a:rPr lang="en-GB" dirty="0"/>
-              <a:t> Project: </a:t>
-            </a:r>
+              <a:rPr lang="en-GB"/>
+              <a:t>Forecasting Daily Electricity Generation in Spain </a:t>
+            </a:r>
+            <a:endParaRPr lang="en-GB" dirty="0"/>
           </a:p>
         </p:txBody>
       </p:sp>
@@ -3405,14 +3411,19 @@
           <a:p>
             <a:r>
               <a:rPr lang="en-GB"/>
-              <a:t>Spanish Forecast</a:t>
-            </a:r>
-            <a:endParaRPr lang="en-GB" dirty="0"/>
-          </a:p>
-          <a:p>
-            <a:r>
-              <a:rPr lang="en-GB" dirty="0"/>
+              <a:t>Capstone Forecasting Project</a:t>
+            </a:r>
+          </a:p>
+          <a:p>
+            <a:r>
+              <a:rPr lang="en-GB"/>
               <a:t>Time Series Analysis</a:t>
+            </a:r>
+          </a:p>
+          <a:p>
+            <a:r>
+              <a:rPr lang="en-GB"/>
+              <a:t>Team: Spanish Forecasters </a:t>
             </a:r>
           </a:p>
           <a:p>
@@ -3424,6 +3435,281 @@
     <p:extLst>
       <p:ext uri="{BB962C8B-B14F-4D97-AF65-F5344CB8AC3E}">
         <p14:creationId xmlns:p14="http://schemas.microsoft.com/office/powerpoint/2010/main" val="178177743"/>
+      </p:ext>
+    </p:extLst>
+  </p:cSld>
+  <p:clrMapOvr>
+    <a:masterClrMapping/>
+  </p:clrMapOvr>
+</p:sld>
+</file>
+
+<file path=ppt/slides/slide10.xml><?xml version="1.0" encoding="utf-8"?>
+<p:sld xmlns:a="http://schemas.openxmlformats.org/drawingml/2006/main" xmlns:r="http://schemas.openxmlformats.org/officeDocument/2006/relationships" xmlns:p="http://schemas.openxmlformats.org/presentationml/2006/main">
+  <p:cSld>
+    <p:spTree>
+      <p:nvGrpSpPr>
+        <p:cNvPr id="1" name=""/>
+        <p:cNvGrpSpPr/>
+        <p:nvPr/>
+      </p:nvGrpSpPr>
+      <p:grpSpPr>
+        <a:xfrm>
+          <a:off x="0" y="0"/>
+          <a:ext cx="0" cy="0"/>
+          <a:chOff x="0" y="0"/>
+          <a:chExt cx="0" cy="0"/>
+        </a:xfrm>
+      </p:grpSpPr>
+      <p:sp>
+        <p:nvSpPr>
+          <p:cNvPr id="2" name="Título 1">
+            <a:extLst>
+              <a:ext uri="{FF2B5EF4-FFF2-40B4-BE49-F238E27FC236}">
+                <a16:creationId xmlns:a16="http://schemas.microsoft.com/office/drawing/2014/main" id="{3FEA39E2-F78C-1BA0-D34B-1BFB19A4D4A9}"/>
+              </a:ext>
+            </a:extLst>
+          </p:cNvPr>
+          <p:cNvSpPr>
+            <a:spLocks noGrp="1"/>
+          </p:cNvSpPr>
+          <p:nvPr>
+            <p:ph type="title"/>
+          </p:nvPr>
+        </p:nvSpPr>
+        <p:spPr/>
+        <p:txBody>
+          <a:bodyPr/>
+          <a:lstStyle/>
+          <a:p>
+            <a:r>
+              <a:rPr lang="en-GB" b="1" dirty="0"/>
+              <a:t>Results &amp; Forecast</a:t>
+            </a:r>
+          </a:p>
+        </p:txBody>
+      </p:sp>
+      <p:sp>
+        <p:nvSpPr>
+          <p:cNvPr id="3" name="Marcador de contenido 2">
+            <a:extLst>
+              <a:ext uri="{FF2B5EF4-FFF2-40B4-BE49-F238E27FC236}">
+                <a16:creationId xmlns:a16="http://schemas.microsoft.com/office/drawing/2014/main" id="{51BEF5E2-BEF8-4AC4-F1B8-B88BDEA14B9B}"/>
+              </a:ext>
+            </a:extLst>
+          </p:cNvPr>
+          <p:cNvSpPr>
+            <a:spLocks noGrp="1"/>
+          </p:cNvSpPr>
+          <p:nvPr>
+            <p:ph sz="half" idx="1"/>
+          </p:nvPr>
+        </p:nvSpPr>
+        <p:spPr/>
+        <p:txBody>
+          <a:bodyPr/>
+          <a:lstStyle/>
+          <a:p>
+            <a:pPr marL="0" indent="0">
+              <a:buNone/>
+            </a:pPr>
+            <a:r>
+              <a:rPr lang="en-GB" b="1" dirty="0"/>
+              <a:t>January 2026 Forecast</a:t>
+            </a:r>
+          </a:p>
+          <a:p>
+            <a:r>
+              <a:rPr lang="en-GB" dirty="0"/>
+              <a:t>Best overall model selected across technologies </a:t>
+            </a:r>
+          </a:p>
+          <a:p>
+            <a:r>
+              <a:rPr lang="en-GB" dirty="0"/>
+              <a:t>Daily forecast for Jan 2026</a:t>
+            </a:r>
+          </a:p>
+          <a:p>
+            <a:r>
+              <a:rPr lang="en-GB" dirty="0"/>
+              <a:t>Outputs: </a:t>
+            </a:r>
+          </a:p>
+          <a:p>
+            <a:pPr lvl="1"/>
+            <a:r>
+              <a:rPr lang="en-GB" dirty="0"/>
+              <a:t>CSV (and Parquet if available)</a:t>
+            </a:r>
+          </a:p>
+        </p:txBody>
+      </p:sp>
+      <p:sp>
+        <p:nvSpPr>
+          <p:cNvPr id="4" name="Marcador de contenido 3">
+            <a:extLst>
+              <a:ext uri="{FF2B5EF4-FFF2-40B4-BE49-F238E27FC236}">
+                <a16:creationId xmlns:a16="http://schemas.microsoft.com/office/drawing/2014/main" id="{B76FBDE1-4D02-C29F-AF06-FAEC019CB013}"/>
+              </a:ext>
+            </a:extLst>
+          </p:cNvPr>
+          <p:cNvSpPr>
+            <a:spLocks noGrp="1"/>
+          </p:cNvSpPr>
+          <p:nvPr>
+            <p:ph sz="half" idx="2"/>
+          </p:nvPr>
+        </p:nvSpPr>
+        <p:spPr/>
+        <p:txBody>
+          <a:bodyPr/>
+          <a:lstStyle/>
+          <a:p>
+            <a:pPr marL="0" indent="0">
+              <a:buNone/>
+            </a:pPr>
+            <a:r>
+              <a:rPr lang="en-GB" b="1" dirty="0"/>
+              <a:t>Uncertainty</a:t>
+            </a:r>
+          </a:p>
+          <a:p>
+            <a:r>
+              <a:rPr lang="en-GB" dirty="0"/>
+              <a:t>Empirical prediction intervals </a:t>
+            </a:r>
+          </a:p>
+          <a:p>
+            <a:r>
+              <a:rPr lang="en-GB" dirty="0"/>
+              <a:t>Based on validation residual quantiles (95%)</a:t>
+            </a:r>
+          </a:p>
+        </p:txBody>
+      </p:sp>
+    </p:spTree>
+    <p:extLst>
+      <p:ext uri="{BB962C8B-B14F-4D97-AF65-F5344CB8AC3E}">
+        <p14:creationId xmlns:p14="http://schemas.microsoft.com/office/powerpoint/2010/main" val="3689835045"/>
+      </p:ext>
+    </p:extLst>
+  </p:cSld>
+  <p:clrMapOvr>
+    <a:masterClrMapping/>
+  </p:clrMapOvr>
+</p:sld>
+</file>
+
+<file path=ppt/slides/slide11.xml><?xml version="1.0" encoding="utf-8"?>
+<p:sld xmlns:a="http://schemas.openxmlformats.org/drawingml/2006/main" xmlns:r="http://schemas.openxmlformats.org/officeDocument/2006/relationships" xmlns:p="http://schemas.openxmlformats.org/presentationml/2006/main">
+  <p:cSld>
+    <p:spTree>
+      <p:nvGrpSpPr>
+        <p:cNvPr id="1" name=""/>
+        <p:cNvGrpSpPr/>
+        <p:nvPr/>
+      </p:nvGrpSpPr>
+      <p:grpSpPr>
+        <a:xfrm>
+          <a:off x="0" y="0"/>
+          <a:ext cx="0" cy="0"/>
+          <a:chOff x="0" y="0"/>
+          <a:chExt cx="0" cy="0"/>
+        </a:xfrm>
+      </p:grpSpPr>
+      <p:sp>
+        <p:nvSpPr>
+          <p:cNvPr id="2" name="Título 1">
+            <a:extLst>
+              <a:ext uri="{FF2B5EF4-FFF2-40B4-BE49-F238E27FC236}">
+                <a16:creationId xmlns:a16="http://schemas.microsoft.com/office/drawing/2014/main" id="{8D2D2313-E4F2-A92B-B35C-5855715907C9}"/>
+              </a:ext>
+            </a:extLst>
+          </p:cNvPr>
+          <p:cNvSpPr>
+            <a:spLocks noGrp="1"/>
+          </p:cNvSpPr>
+          <p:nvPr>
+            <p:ph type="title"/>
+          </p:nvPr>
+        </p:nvSpPr>
+        <p:spPr/>
+        <p:txBody>
+          <a:bodyPr/>
+          <a:lstStyle/>
+          <a:p>
+            <a:r>
+              <a:rPr lang="en-GB" b="1" dirty="0"/>
+              <a:t>Value &amp; Conclusion</a:t>
+            </a:r>
+          </a:p>
+        </p:txBody>
+      </p:sp>
+      <p:sp>
+        <p:nvSpPr>
+          <p:cNvPr id="3" name="Marcador de contenido 2">
+            <a:extLst>
+              <a:ext uri="{FF2B5EF4-FFF2-40B4-BE49-F238E27FC236}">
+                <a16:creationId xmlns:a16="http://schemas.microsoft.com/office/drawing/2014/main" id="{C62105F7-D478-7E13-EDE7-CCB821749367}"/>
+              </a:ext>
+            </a:extLst>
+          </p:cNvPr>
+          <p:cNvSpPr>
+            <a:spLocks noGrp="1"/>
+          </p:cNvSpPr>
+          <p:nvPr>
+            <p:ph idx="1"/>
+          </p:nvPr>
+        </p:nvSpPr>
+        <p:spPr/>
+        <p:txBody>
+          <a:bodyPr/>
+          <a:lstStyle/>
+          <a:p>
+            <a:r>
+              <a:rPr lang="en-GB" b="1" dirty="0"/>
+              <a:t>Value Generated:</a:t>
+            </a:r>
+            <a:r>
+              <a:rPr lang="en-GB" dirty="0"/>
+              <a:t> </a:t>
+            </a:r>
+          </a:p>
+          <a:p>
+            <a:pPr lvl="1"/>
+            <a:r>
+              <a:rPr lang="en-GB" dirty="0"/>
+              <a:t>Better planning of energy balance and reserves</a:t>
+            </a:r>
+          </a:p>
+          <a:p>
+            <a:pPr lvl="1"/>
+            <a:r>
+              <a:rPr lang="en-GB" dirty="0"/>
+              <a:t>Improved risk-aware decision-making</a:t>
+            </a:r>
+          </a:p>
+          <a:p>
+            <a:pPr lvl="1"/>
+            <a:r>
+              <a:rPr lang="en-GB" dirty="0"/>
+              <a:t>Useful even with uncertainty</a:t>
+            </a:r>
+          </a:p>
+          <a:p>
+            <a:r>
+              <a:rPr lang="en-GB" b="1" dirty="0"/>
+              <a:t>Conclusion:</a:t>
+            </a:r>
+            <a:endParaRPr lang="en-GB" dirty="0"/>
+          </a:p>
+        </p:txBody>
+      </p:sp>
+    </p:spTree>
+    <p:extLst>
+      <p:ext uri="{BB962C8B-B14F-4D97-AF65-F5344CB8AC3E}">
+        <p14:creationId xmlns:p14="http://schemas.microsoft.com/office/powerpoint/2010/main" val="1824216392"/>
       </p:ext>
     </p:extLst>
   </p:cSld>
@@ -3473,7 +3759,7 @@
           <a:p>
             <a:r>
               <a:rPr lang="en-GB" dirty="0"/>
-              <a:t>Team</a:t>
+              <a:t>Team &amp; Contributions. REVISAR LO DE CADA UNO </a:t>
             </a:r>
           </a:p>
         </p:txBody>
@@ -3700,9 +3986,12 @@
           <a:bodyPr/>
           <a:lstStyle/>
           <a:p>
-            <a:r>
-              <a:rPr lang="en-GB" dirty="0"/>
-              <a:t>Plot from code prediction </a:t>
+            <a:pPr marL="0" indent="0">
+              <a:buNone/>
+            </a:pPr>
+            <a:r>
+              <a:rPr lang="en-GB" dirty="0"/>
+              <a:t> </a:t>
             </a:r>
           </a:p>
         </p:txBody>
@@ -3739,11 +4028,11 @@
             </a:pPr>
             <a:r>
               <a:rPr lang="en-GB" b="1" dirty="0"/>
-              <a:t>Goal: </a:t>
-            </a:r>
-            <a:r>
-              <a:rPr lang="en-GB" dirty="0"/>
-              <a:t>Forecast daily electricity generation for Spain by production technology (top technologies) for January 2026</a:t>
+              <a:t>Problem: </a:t>
+            </a:r>
+            <a:r>
+              <a:rPr lang="en-GB" dirty="0"/>
+              <a:t>Electricity generation varies due to the weather, demand or seasonality. This creates uncertainty for system planning.</a:t>
             </a:r>
           </a:p>
           <a:p>
@@ -3753,55 +4042,59 @@
             </a:pPr>
             <a:r>
               <a:rPr lang="en-GB" b="1" dirty="0"/>
-              <a:t>Why it matters: </a:t>
-            </a:r>
-            <a:r>
-              <a:rPr lang="en-GB" dirty="0"/>
-              <a:t>If we can predict generation more accurately, we can improve planning and reduce risk. Forecast help:</a:t>
-            </a:r>
-          </a:p>
-          <a:p>
-            <a:pPr marL="742950" lvl="1" indent="-285750">
+              <a:t>Goal: </a:t>
+            </a:r>
+            <a:r>
+              <a:rPr lang="en-GB" dirty="0"/>
+              <a:t>Forecast daily electricity generation for Spain by production technology for January 2026. CAMBIAR</a:t>
+            </a:r>
+          </a:p>
+          <a:p>
+            <a:pPr marL="285750" indent="-285750">
               <a:buFont typeface="Arial" panose="020B0604020202020204" pitchFamily="34" charset="0"/>
               <a:buChar char="•"/>
             </a:pPr>
-            <a:r>
-              <a:rPr lang="en-GB" dirty="0"/>
-              <a:t>Operational planning (balancing supply)</a:t>
-            </a:r>
-          </a:p>
-          <a:p>
-            <a:pPr marL="742950" lvl="1" indent="-285750">
+            <a:endParaRPr lang="en-GB" dirty="0"/>
+          </a:p>
+          <a:p>
+            <a:pPr marL="285750" indent="-285750">
               <a:buFont typeface="Arial" panose="020B0604020202020204" pitchFamily="34" charset="0"/>
               <a:buChar char="•"/>
             </a:pPr>
-            <a:r>
-              <a:rPr lang="en-GB" dirty="0"/>
-              <a:t>Resource scheduling </a:t>
-            </a:r>
-          </a:p>
-          <a:p>
-            <a:pPr marL="742950" lvl="1" indent="-285750">
-              <a:buFont typeface="Arial" panose="020B0604020202020204" pitchFamily="34" charset="0"/>
-              <a:buChar char="•"/>
-            </a:pPr>
-            <a:r>
-              <a:rPr lang="en-GB" dirty="0"/>
-              <a:t>Market decisions and risk management</a:t>
-            </a:r>
-          </a:p>
-          <a:p>
-            <a:pPr marL="742950" lvl="1" indent="-285750">
-              <a:buFont typeface="Arial" panose="020B0604020202020204" pitchFamily="34" charset="0"/>
-              <a:buChar char="•"/>
-            </a:pPr>
-            <a:r>
-              <a:rPr lang="en-GB" dirty="0"/>
-              <a:t>And better preparation when uncertainty is high</a:t>
-            </a:r>
-          </a:p>
-        </p:txBody>
-      </p:sp>
+            <a:endParaRPr lang="en-GB" dirty="0"/>
+          </a:p>
+        </p:txBody>
+      </p:sp>
+      <p:pic>
+        <p:nvPicPr>
+          <p:cNvPr id="6" name="Imagen 5" descr="Gráfico&#10;&#10;El contenido generado por IA puede ser incorrecto.">
+            <a:extLst>
+              <a:ext uri="{FF2B5EF4-FFF2-40B4-BE49-F238E27FC236}">
+                <a16:creationId xmlns:a16="http://schemas.microsoft.com/office/drawing/2014/main" id="{0ABE41F3-A217-D9FB-3780-61E5B5AD2736}"/>
+              </a:ext>
+            </a:extLst>
+          </p:cNvPr>
+          <p:cNvPicPr>
+            <a:picLocks noChangeAspect="1"/>
+          </p:cNvPicPr>
+          <p:nvPr/>
+        </p:nvPicPr>
+        <p:blipFill>
+          <a:blip r:embed="rId2"/>
+          <a:stretch>
+            <a:fillRect/>
+          </a:stretch>
+        </p:blipFill>
+        <p:spPr>
+          <a:xfrm>
+            <a:off x="4772025" y="1363580"/>
+            <a:ext cx="6756744" cy="3352800"/>
+          </a:xfrm>
+          <a:prstGeom prst="rect">
+            <a:avLst/>
+          </a:prstGeom>
+        </p:spPr>
+      </p:pic>
     </p:spTree>
     <p:extLst>
       <p:ext uri="{BB962C8B-B14F-4D97-AF65-F5344CB8AC3E}">
@@ -3837,7 +4130,7 @@
           <p:cNvPr id="2" name="Título 1">
             <a:extLst>
               <a:ext uri="{FF2B5EF4-FFF2-40B4-BE49-F238E27FC236}">
-                <a16:creationId xmlns:a16="http://schemas.microsoft.com/office/drawing/2014/main" id="{42A9E8B0-5780-1E83-BEA3-DA915D48DCB9}"/>
+                <a16:creationId xmlns:a16="http://schemas.microsoft.com/office/drawing/2014/main" id="{BF770FDD-F60D-CD86-6B5D-42D104681284}"/>
               </a:ext>
             </a:extLst>
           </p:cNvPr>
@@ -3855,7 +4148,7 @@
           <a:p>
             <a:r>
               <a:rPr lang="en-GB" b="1" dirty="0"/>
-              <a:t>Solution Overview (CRISP-DM style)</a:t>
+              <a:t>Why Forecasting Matters?</a:t>
             </a:r>
           </a:p>
         </p:txBody>
@@ -3865,7 +4158,7 @@
           <p:cNvPr id="3" name="Marcador de contenido 2">
             <a:extLst>
               <a:ext uri="{FF2B5EF4-FFF2-40B4-BE49-F238E27FC236}">
-                <a16:creationId xmlns:a16="http://schemas.microsoft.com/office/drawing/2014/main" id="{7894CECC-7894-ECB1-EB7F-3348F971579B}"/>
+                <a16:creationId xmlns:a16="http://schemas.microsoft.com/office/drawing/2014/main" id="{DB0D5D11-1F12-A2BB-0779-DA3F2FC7F378}"/>
               </a:ext>
             </a:extLst>
           </p:cNvPr>
@@ -3878,49 +4171,43 @@
         </p:nvSpPr>
         <p:spPr/>
         <p:txBody>
-          <a:bodyPr>
-            <a:normAutofit fontScale="92500" lnSpcReduction="10000"/>
-          </a:bodyPr>
-          <a:lstStyle/>
-          <a:p>
-            <a:pPr marL="514350" indent="-514350">
-              <a:buAutoNum type="arabicPeriod"/>
+          <a:bodyPr/>
+          <a:lstStyle/>
+          <a:p>
+            <a:r>
+              <a:rPr lang="en-GB" dirty="0"/>
+              <a:t>Accurate forecast support:</a:t>
+            </a:r>
+          </a:p>
+          <a:p>
+            <a:pPr lvl="1"/>
+            <a:r>
+              <a:rPr lang="en-GB" dirty="0"/>
+              <a:t>Operational planning and balancing </a:t>
+            </a:r>
+          </a:p>
+          <a:p>
+            <a:pPr lvl="1"/>
+            <a:r>
+              <a:rPr lang="en-GB" dirty="0"/>
+              <a:t>Resource scheduling</a:t>
+            </a:r>
+          </a:p>
+          <a:p>
+            <a:pPr lvl="1"/>
+            <a:r>
+              <a:rPr lang="en-GB" dirty="0"/>
+              <a:t>Markt decisions and risk management</a:t>
+            </a:r>
+          </a:p>
+          <a:p>
+            <a:pPr marL="457200" lvl="1" indent="0">
+              <a:buNone/>
             </a:pPr>
             <a:r>
-              <a:rPr lang="en-GB" b="1" dirty="0"/>
-              <a:t>Business understanding: </a:t>
-            </a:r>
-            <a:r>
-              <a:rPr lang="en-GB" dirty="0"/>
-              <a:t>define the forecasting goal and the value.</a:t>
-            </a:r>
-          </a:p>
-          <a:p>
-            <a:pPr marL="514350" indent="-514350">
-              <a:buAutoNum type="arabicPeriod"/>
-            </a:pPr>
-            <a:r>
-              <a:rPr lang="en-GB" b="1" dirty="0"/>
-              <a:t>Data understanding: </a:t>
-            </a:r>
-            <a:r>
-              <a:rPr lang="en-GB" dirty="0"/>
-              <a:t>inspect the dataset, frequency, trends, seasonality, missing values.</a:t>
-            </a:r>
-          </a:p>
-          <a:p>
-            <a:pPr marL="514350" indent="-514350">
-              <a:buAutoNum type="arabicPeriod"/>
-            </a:pPr>
-            <a:r>
-              <a:rPr lang="en-GB" b="1" dirty="0"/>
-              <a:t>Data preparation: </a:t>
-            </a:r>
-            <a:r>
-              <a:rPr lang="en-GB" dirty="0"/>
-              <a:t>clean, reshape, and build a final time series dataset. </a:t>
-            </a:r>
-            <a:endParaRPr lang="en-GB" b="1" dirty="0"/>
+              <a:rPr lang="en-GB" dirty="0"/>
+              <a:t> </a:t>
+            </a:r>
           </a:p>
         </p:txBody>
       </p:sp>
@@ -3929,7 +4216,7 @@
           <p:cNvPr id="4" name="Marcador de contenido 3">
             <a:extLst>
               <a:ext uri="{FF2B5EF4-FFF2-40B4-BE49-F238E27FC236}">
-                <a16:creationId xmlns:a16="http://schemas.microsoft.com/office/drawing/2014/main" id="{36039BA5-2B95-6EF8-D781-F966AF02BADC}"/>
+                <a16:creationId xmlns:a16="http://schemas.microsoft.com/office/drawing/2014/main" id="{3AD3EC20-713B-F674-A0B0-6E0154253C25}"/>
               </a:ext>
             </a:extLst>
           </p:cNvPr>
@@ -3942,69 +4229,41 @@
         </p:nvSpPr>
         <p:spPr/>
         <p:txBody>
-          <a:bodyPr>
-            <a:normAutofit fontScale="92500" lnSpcReduction="10000"/>
-          </a:bodyPr>
-          <a:lstStyle/>
-          <a:p>
-            <a:pPr marL="0" indent="0">
-              <a:buNone/>
-            </a:pPr>
-            <a:r>
-              <a:rPr lang="en-GB" b="1" dirty="0"/>
-              <a:t>4. Feature engineering: </a:t>
-            </a:r>
-            <a:r>
-              <a:rPr lang="en-GB" dirty="0"/>
-              <a:t>create lag features, calendar features…</a:t>
-            </a:r>
-          </a:p>
-          <a:p>
-            <a:pPr marL="0" indent="0">
-              <a:buNone/>
-            </a:pPr>
-            <a:r>
-              <a:rPr lang="en-GB" b="1" dirty="0"/>
-              <a:t>5. Modelling: </a:t>
-            </a:r>
-            <a:r>
-              <a:rPr lang="en-GB" dirty="0"/>
-              <a:t>train model families used in class (baselines, statistical, ML, neural)</a:t>
-            </a:r>
-          </a:p>
-          <a:p>
-            <a:pPr marL="0" indent="0">
-              <a:buNone/>
-            </a:pPr>
-            <a:r>
-              <a:rPr lang="en-GB" b="1" dirty="0"/>
-              <a:t>6. Evaluation: </a:t>
-            </a:r>
-            <a:r>
-              <a:rPr lang="en-GB" dirty="0"/>
-              <a:t>time-based validation/test split, metrics and plots. </a:t>
-            </a:r>
-          </a:p>
-          <a:p>
-            <a:pPr marL="0" indent="0">
-              <a:buNone/>
-            </a:pPr>
-            <a:r>
-              <a:rPr lang="en-GB" b="1" dirty="0"/>
-              <a:t>7. Deployment output: </a:t>
-            </a:r>
-            <a:r>
-              <a:rPr lang="en-GB" dirty="0"/>
-              <a:t>forecast January 2026, export predictions, save metrics for reporting. </a:t>
-            </a:r>
-            <a:endParaRPr lang="en-GB" b="1" dirty="0"/>
+          <a:bodyPr/>
+          <a:lstStyle/>
+          <a:p>
+            <a:r>
+              <a:rPr lang="en-GB" dirty="0"/>
+              <a:t>Without forecast:</a:t>
+            </a:r>
+          </a:p>
+          <a:p>
+            <a:pPr lvl="1"/>
+            <a:r>
+              <a:rPr lang="en-GB" dirty="0"/>
+              <a:t>Reactive decisions </a:t>
+            </a:r>
+          </a:p>
+          <a:p>
+            <a:pPr lvl="1"/>
+            <a:r>
+              <a:rPr lang="en-GB" dirty="0"/>
+              <a:t>Higher operational risk </a:t>
+            </a:r>
+          </a:p>
+          <a:p>
+            <a:pPr lvl="1"/>
+            <a:r>
+              <a:rPr lang="en-GB" dirty="0"/>
+              <a:t>Potential extra costs </a:t>
+            </a:r>
           </a:p>
         </p:txBody>
       </p:sp>
     </p:spTree>
     <p:extLst>
       <p:ext uri="{BB962C8B-B14F-4D97-AF65-F5344CB8AC3E}">
-        <p14:creationId xmlns:p14="http://schemas.microsoft.com/office/powerpoint/2010/main" val="1507118366"/>
+        <p14:creationId xmlns:p14="http://schemas.microsoft.com/office/powerpoint/2010/main" val="41098194"/>
       </p:ext>
     </p:extLst>
   </p:cSld>
@@ -4036,7 +4295,7 @@
           <p:cNvPr id="2" name="Título 1">
             <a:extLst>
               <a:ext uri="{FF2B5EF4-FFF2-40B4-BE49-F238E27FC236}">
-                <a16:creationId xmlns:a16="http://schemas.microsoft.com/office/drawing/2014/main" id="{B2CCA1F6-B7F6-4AA7-94BB-14C33D029142}"/>
+                <a16:creationId xmlns:a16="http://schemas.microsoft.com/office/drawing/2014/main" id="{42A9E8B0-5780-1E83-BEA3-DA915D48DCB9}"/>
               </a:ext>
             </a:extLst>
           </p:cNvPr>
@@ -4053,16 +4312,157 @@
           <a:lstStyle/>
           <a:p>
             <a:r>
-              <a:rPr lang="en-GB" dirty="0"/>
-              <a:t>Outputs</a:t>
-            </a:r>
+              <a:rPr lang="en-GB" b="1" dirty="0"/>
+              <a:t>Solution Overview (CRISP-DM style). REISAR</a:t>
+            </a:r>
+          </a:p>
+        </p:txBody>
+      </p:sp>
+      <p:sp>
+        <p:nvSpPr>
+          <p:cNvPr id="3" name="Marcador de contenido 2">
+            <a:extLst>
+              <a:ext uri="{FF2B5EF4-FFF2-40B4-BE49-F238E27FC236}">
+                <a16:creationId xmlns:a16="http://schemas.microsoft.com/office/drawing/2014/main" id="{7894CECC-7894-ECB1-EB7F-3348F971579B}"/>
+              </a:ext>
+            </a:extLst>
+          </p:cNvPr>
+          <p:cNvSpPr>
+            <a:spLocks noGrp="1"/>
+          </p:cNvSpPr>
+          <p:nvPr>
+            <p:ph sz="half" idx="1"/>
+          </p:nvPr>
+        </p:nvSpPr>
+        <p:spPr/>
+        <p:txBody>
+          <a:bodyPr>
+            <a:normAutofit fontScale="92500" lnSpcReduction="10000"/>
+          </a:bodyPr>
+          <a:lstStyle/>
+          <a:p>
+            <a:pPr marL="514350" indent="-514350">
+              <a:buAutoNum type="arabicPeriod"/>
+            </a:pPr>
+            <a:r>
+              <a:rPr lang="en-GB" b="1" dirty="0"/>
+              <a:t>Business understanding: </a:t>
+            </a:r>
+            <a:r>
+              <a:rPr lang="en-GB" dirty="0"/>
+              <a:t>define the forecasting goal and the value.</a:t>
+            </a:r>
+          </a:p>
+          <a:p>
+            <a:pPr marL="514350" indent="-514350">
+              <a:buAutoNum type="arabicPeriod"/>
+            </a:pPr>
+            <a:r>
+              <a:rPr lang="en-GB" b="1" dirty="0"/>
+              <a:t>Data understanding: </a:t>
+            </a:r>
+            <a:r>
+              <a:rPr lang="en-GB" dirty="0"/>
+              <a:t>inspect the dataset, frequency, trends, seasonality, missing values.</a:t>
+            </a:r>
+          </a:p>
+          <a:p>
+            <a:pPr marL="514350" indent="-514350">
+              <a:buAutoNum type="arabicPeriod"/>
+            </a:pPr>
+            <a:r>
+              <a:rPr lang="en-GB" b="1" dirty="0"/>
+              <a:t>Data preparation: </a:t>
+            </a:r>
+            <a:r>
+              <a:rPr lang="en-GB" dirty="0"/>
+              <a:t>clean, reshape, and build a final time series dataset. </a:t>
+            </a:r>
+            <a:endParaRPr lang="en-GB" b="1" dirty="0"/>
+          </a:p>
+        </p:txBody>
+      </p:sp>
+      <p:sp>
+        <p:nvSpPr>
+          <p:cNvPr id="4" name="Marcador de contenido 3">
+            <a:extLst>
+              <a:ext uri="{FF2B5EF4-FFF2-40B4-BE49-F238E27FC236}">
+                <a16:creationId xmlns:a16="http://schemas.microsoft.com/office/drawing/2014/main" id="{36039BA5-2B95-6EF8-D781-F966AF02BADC}"/>
+              </a:ext>
+            </a:extLst>
+          </p:cNvPr>
+          <p:cNvSpPr>
+            <a:spLocks noGrp="1"/>
+          </p:cNvSpPr>
+          <p:nvPr>
+            <p:ph sz="half" idx="2"/>
+          </p:nvPr>
+        </p:nvSpPr>
+        <p:spPr/>
+        <p:txBody>
+          <a:bodyPr>
+            <a:normAutofit fontScale="92500" lnSpcReduction="10000"/>
+          </a:bodyPr>
+          <a:lstStyle/>
+          <a:p>
+            <a:pPr marL="0" indent="0">
+              <a:buNone/>
+            </a:pPr>
+            <a:r>
+              <a:rPr lang="en-GB" b="1" dirty="0"/>
+              <a:t>4. Feature engineering: </a:t>
+            </a:r>
+            <a:r>
+              <a:rPr lang="en-GB" dirty="0"/>
+              <a:t>create lag features, calendar features…</a:t>
+            </a:r>
+          </a:p>
+          <a:p>
+            <a:pPr marL="0" indent="0">
+              <a:buNone/>
+            </a:pPr>
+            <a:r>
+              <a:rPr lang="en-GB" b="1" dirty="0"/>
+              <a:t>5. Modelling: </a:t>
+            </a:r>
+            <a:r>
+              <a:rPr lang="en-GB" dirty="0"/>
+              <a:t>train model families used in class (baselines, statistical, ML, neural)</a:t>
+            </a:r>
+          </a:p>
+          <a:p>
+            <a:pPr marL="0" indent="0">
+              <a:buNone/>
+            </a:pPr>
+            <a:r>
+              <a:rPr lang="en-GB" b="1" dirty="0"/>
+              <a:t>6. Evaluation: </a:t>
+            </a:r>
+            <a:r>
+              <a:rPr lang="en-GB" dirty="0"/>
+              <a:t>time-based validation/test split, metrics and plots. </a:t>
+            </a:r>
+          </a:p>
+          <a:p>
+            <a:pPr marL="0" indent="0">
+              <a:buNone/>
+            </a:pPr>
+            <a:r>
+              <a:rPr lang="en-GB" b="1" dirty="0"/>
+              <a:t>7. Deployment output: </a:t>
+            </a:r>
+            <a:r>
+              <a:rPr lang="en-GB" dirty="0"/>
+              <a:t>forecast January 2026, export predictions, save metrics for reporting. </a:t>
+            </a:r>
+            <a:endParaRPr lang="en-GB" b="1" dirty="0"/>
           </a:p>
         </p:txBody>
       </p:sp>
     </p:spTree>
     <p:extLst>
       <p:ext uri="{BB962C8B-B14F-4D97-AF65-F5344CB8AC3E}">
-        <p14:creationId xmlns:p14="http://schemas.microsoft.com/office/powerpoint/2010/main" val="1997678326"/>
+        <p14:creationId xmlns:p14="http://schemas.microsoft.com/office/powerpoint/2010/main" val="1507118366"/>
       </p:ext>
     </p:extLst>
   </p:cSld>
@@ -4139,18 +4539,22 @@
           <a:lstStyle/>
           <a:p>
             <a:r>
+              <a:rPr lang="en-GB" dirty="0"/>
+              <a:t>Source:</a:t>
+            </a:r>
+            <a:r>
               <a:rPr lang="en-GB" b="1" dirty="0"/>
-              <a:t>Data source: </a:t>
-            </a:r>
-            <a:r>
-              <a:rPr lang="en-GB" dirty="0"/>
-              <a:t>Spanish Electric Net (REE) </a:t>
-            </a:r>
-          </a:p>
-          <a:p>
-            <a:r>
-              <a:rPr lang="en-GB" dirty="0"/>
-              <a:t>Open, public, daily updated </a:t>
+              <a:t> </a:t>
+            </a:r>
+            <a:r>
+              <a:rPr lang="en-GB" dirty="0"/>
+              <a:t>Spanish Electric Network (REE) </a:t>
+            </a:r>
+          </a:p>
+          <a:p>
+            <a:r>
+              <a:rPr lang="en-GB" dirty="0"/>
+              <a:t>Frequency: daily</a:t>
             </a:r>
           </a:p>
           <a:p>
@@ -4237,8 +4641,8 @@
           <a:lstStyle/>
           <a:p>
             <a:r>
-              <a:rPr lang="en-GB" dirty="0"/>
-              <a:t>Data Insight </a:t>
+              <a:rPr lang="en-GB" b="1" dirty="0"/>
+              <a:t>Data Preparation</a:t>
             </a:r>
           </a:p>
         </p:txBody>
@@ -4264,6 +4668,105 @@
           <a:bodyPr/>
           <a:lstStyle/>
           <a:p>
+            <a:pPr marL="0" indent="0">
+              <a:buNone/>
+            </a:pPr>
+            <a:r>
+              <a:rPr lang="en-GB" b="1" dirty="0"/>
+              <a:t>From Raw Data to Panel Dataset </a:t>
+            </a:r>
+          </a:p>
+          <a:p>
+            <a:pPr marL="514350" indent="-514350">
+              <a:buFont typeface="+mj-lt"/>
+              <a:buAutoNum type="arabicPeriod"/>
+            </a:pPr>
+            <a:r>
+              <a:rPr lang="en-GB" dirty="0"/>
+              <a:t>Convert raw data to panel format:</a:t>
+            </a:r>
+          </a:p>
+          <a:p>
+            <a:pPr lvl="1"/>
+            <a:r>
+              <a:rPr lang="en-GB" b="1" dirty="0" err="1"/>
+              <a:t>unique_id</a:t>
+            </a:r>
+            <a:r>
+              <a:rPr lang="en-GB" b="1" dirty="0"/>
+              <a:t>:</a:t>
+            </a:r>
+            <a:r>
+              <a:rPr lang="en-GB" dirty="0"/>
+              <a:t> technology</a:t>
+            </a:r>
+          </a:p>
+          <a:p>
+            <a:pPr lvl="1"/>
+            <a:r>
+              <a:rPr lang="en-GB" b="1" dirty="0"/>
+              <a:t>ds: </a:t>
+            </a:r>
+            <a:r>
+              <a:rPr lang="en-GB" dirty="0"/>
+              <a:t>date</a:t>
+            </a:r>
+          </a:p>
+          <a:p>
+            <a:pPr lvl="1"/>
+            <a:r>
+              <a:rPr lang="en-GB" b="1" dirty="0"/>
+              <a:t>y: </a:t>
+            </a:r>
+            <a:r>
+              <a:rPr lang="en-GB" dirty="0"/>
+              <a:t>daily generation </a:t>
+            </a:r>
+            <a:r>
+              <a:rPr lang="en-GB" b="1" dirty="0"/>
+              <a:t> </a:t>
+            </a:r>
+          </a:p>
+          <a:p>
+            <a:pPr marL="514350" indent="-514350">
+              <a:buFont typeface="+mj-lt"/>
+              <a:buAutoNum type="arabicPeriod"/>
+            </a:pPr>
+            <a:r>
+              <a:rPr lang="en-GB" dirty="0"/>
+              <a:t>Clean dates and numeric values</a:t>
+            </a:r>
+          </a:p>
+          <a:p>
+            <a:pPr marL="514350" indent="-514350">
+              <a:buFont typeface="+mj-lt"/>
+              <a:buAutoNum type="arabicPeriod"/>
+            </a:pPr>
+            <a:r>
+              <a:rPr lang="en-GB" dirty="0"/>
+              <a:t>Ensures complete daily calendar </a:t>
+            </a:r>
+          </a:p>
+          <a:p>
+            <a:pPr marL="514350" indent="-514350">
+              <a:buFont typeface="+mj-lt"/>
+              <a:buAutoNum type="arabicPeriod"/>
+            </a:pPr>
+            <a:r>
+              <a:rPr lang="en-GB" dirty="0"/>
+              <a:t>Validate and handle missing days</a:t>
+            </a:r>
+          </a:p>
+          <a:p>
+            <a:pPr marL="914400" lvl="2" indent="0">
+              <a:buNone/>
+            </a:pPr>
+            <a:endParaRPr lang="en-GB" dirty="0"/>
+          </a:p>
+          <a:p>
+            <a:pPr marL="457200" lvl="1" indent="0">
+              <a:buNone/>
+            </a:pPr>
             <a:endParaRPr lang="en-GB" dirty="0"/>
           </a:p>
         </p:txBody>
@@ -4272,6 +4775,444 @@
     <p:extLst>
       <p:ext uri="{BB962C8B-B14F-4D97-AF65-F5344CB8AC3E}">
         <p14:creationId xmlns:p14="http://schemas.microsoft.com/office/powerpoint/2010/main" val="3946387973"/>
+      </p:ext>
+    </p:extLst>
+  </p:cSld>
+  <p:clrMapOvr>
+    <a:masterClrMapping/>
+  </p:clrMapOvr>
+</p:sld>
+</file>
+
+<file path=ppt/slides/slide8.xml><?xml version="1.0" encoding="utf-8"?>
+<p:sld xmlns:a="http://schemas.openxmlformats.org/drawingml/2006/main" xmlns:r="http://schemas.openxmlformats.org/officeDocument/2006/relationships" xmlns:p="http://schemas.openxmlformats.org/presentationml/2006/main">
+  <p:cSld>
+    <p:spTree>
+      <p:nvGrpSpPr>
+        <p:cNvPr id="1" name=""/>
+        <p:cNvGrpSpPr/>
+        <p:nvPr/>
+      </p:nvGrpSpPr>
+      <p:grpSpPr>
+        <a:xfrm>
+          <a:off x="0" y="0"/>
+          <a:ext cx="0" cy="0"/>
+          <a:chOff x="0" y="0"/>
+          <a:chExt cx="0" cy="0"/>
+        </a:xfrm>
+      </p:grpSpPr>
+      <p:sp>
+        <p:nvSpPr>
+          <p:cNvPr id="2" name="Título 1">
+            <a:extLst>
+              <a:ext uri="{FF2B5EF4-FFF2-40B4-BE49-F238E27FC236}">
+                <a16:creationId xmlns:a16="http://schemas.microsoft.com/office/drawing/2014/main" id="{3840B8F3-0CD4-9CA2-2B32-6AD32D18E6F2}"/>
+              </a:ext>
+            </a:extLst>
+          </p:cNvPr>
+          <p:cNvSpPr>
+            <a:spLocks noGrp="1"/>
+          </p:cNvSpPr>
+          <p:nvPr>
+            <p:ph type="title"/>
+          </p:nvPr>
+        </p:nvSpPr>
+        <p:spPr/>
+        <p:txBody>
+          <a:bodyPr/>
+          <a:lstStyle/>
+          <a:p>
+            <a:r>
+              <a:rPr lang="en-GB" b="1" dirty="0"/>
+              <a:t>Model Families Tested </a:t>
+            </a:r>
+          </a:p>
+        </p:txBody>
+      </p:sp>
+      <p:sp>
+        <p:nvSpPr>
+          <p:cNvPr id="3" name="Marcador de contenido 2">
+            <a:extLst>
+              <a:ext uri="{FF2B5EF4-FFF2-40B4-BE49-F238E27FC236}">
+                <a16:creationId xmlns:a16="http://schemas.microsoft.com/office/drawing/2014/main" id="{B458AE76-16F3-9322-3513-6AC62BEFCF9C}"/>
+              </a:ext>
+            </a:extLst>
+          </p:cNvPr>
+          <p:cNvSpPr>
+            <a:spLocks noGrp="1"/>
+          </p:cNvSpPr>
+          <p:nvPr>
+            <p:ph sz="half" idx="1"/>
+          </p:nvPr>
+        </p:nvSpPr>
+        <p:spPr/>
+        <p:txBody>
+          <a:bodyPr/>
+          <a:lstStyle/>
+          <a:p>
+            <a:r>
+              <a:rPr lang="en-GB" b="1" dirty="0"/>
+              <a:t>Baselines:</a:t>
+            </a:r>
+          </a:p>
+          <a:p>
+            <a:pPr lvl="1"/>
+            <a:r>
+              <a:rPr lang="en-GB" dirty="0"/>
+              <a:t>Naive </a:t>
+            </a:r>
+          </a:p>
+          <a:p>
+            <a:pPr lvl="1"/>
+            <a:r>
+              <a:rPr lang="en-GB" dirty="0"/>
+              <a:t>Moving average</a:t>
+            </a:r>
+          </a:p>
+          <a:p>
+            <a:r>
+              <a:rPr lang="en-GB" b="1" dirty="0"/>
+              <a:t>Statistical:</a:t>
+            </a:r>
+          </a:p>
+          <a:p>
+            <a:pPr lvl="1"/>
+            <a:r>
+              <a:rPr lang="en-GB" dirty="0" err="1"/>
+              <a:t>AutoARIMA</a:t>
+            </a:r>
+            <a:endParaRPr lang="en-GB" dirty="0"/>
+          </a:p>
+          <a:p>
+            <a:r>
+              <a:rPr lang="en-GB" b="1" dirty="0"/>
+              <a:t>Machine Learning:</a:t>
+            </a:r>
+          </a:p>
+          <a:p>
+            <a:pPr lvl="1"/>
+            <a:r>
+              <a:rPr lang="en-GB" dirty="0"/>
+              <a:t>Random Forest</a:t>
+            </a:r>
+          </a:p>
+          <a:p>
+            <a:pPr lvl="1"/>
+            <a:r>
+              <a:rPr lang="en-GB" dirty="0"/>
+              <a:t>Gradient Boosting</a:t>
+            </a:r>
+          </a:p>
+          <a:p>
+            <a:pPr lvl="1"/>
+            <a:r>
+              <a:rPr lang="en-GB" dirty="0"/>
+              <a:t>Lag, calendar &amp; rolling features</a:t>
+            </a:r>
+          </a:p>
+          <a:p>
+            <a:pPr marL="0" indent="0">
+              <a:buNone/>
+            </a:pPr>
+            <a:endParaRPr lang="en-GB" b="1" dirty="0"/>
+          </a:p>
+        </p:txBody>
+      </p:sp>
+      <p:sp>
+        <p:nvSpPr>
+          <p:cNvPr id="4" name="Marcador de contenido 3">
+            <a:extLst>
+              <a:ext uri="{FF2B5EF4-FFF2-40B4-BE49-F238E27FC236}">
+                <a16:creationId xmlns:a16="http://schemas.microsoft.com/office/drawing/2014/main" id="{CBE12D95-E880-5C96-778D-FF051D5DB324}"/>
+              </a:ext>
+            </a:extLst>
+          </p:cNvPr>
+          <p:cNvSpPr>
+            <a:spLocks noGrp="1"/>
+          </p:cNvSpPr>
+          <p:nvPr>
+            <p:ph sz="half" idx="2"/>
+          </p:nvPr>
+        </p:nvSpPr>
+        <p:spPr/>
+        <p:txBody>
+          <a:bodyPr/>
+          <a:lstStyle/>
+          <a:p>
+            <a:r>
+              <a:rPr lang="en-GB" b="1" dirty="0"/>
+              <a:t>Deep Learning:</a:t>
+            </a:r>
+          </a:p>
+          <a:p>
+            <a:pPr lvl="1"/>
+            <a:r>
+              <a:rPr lang="en-GB" dirty="0"/>
+              <a:t>NBEATS</a:t>
+            </a:r>
+          </a:p>
+          <a:p>
+            <a:pPr lvl="1"/>
+            <a:r>
+              <a:rPr lang="en-GB" dirty="0" err="1"/>
+              <a:t>NLinear</a:t>
+            </a:r>
+            <a:endParaRPr lang="en-GB" dirty="0"/>
+          </a:p>
+        </p:txBody>
+      </p:sp>
+    </p:spTree>
+    <p:extLst>
+      <p:ext uri="{BB962C8B-B14F-4D97-AF65-F5344CB8AC3E}">
+        <p14:creationId xmlns:p14="http://schemas.microsoft.com/office/powerpoint/2010/main" val="702062300"/>
+      </p:ext>
+    </p:extLst>
+  </p:cSld>
+  <p:clrMapOvr>
+    <a:masterClrMapping/>
+  </p:clrMapOvr>
+</p:sld>
+</file>
+
+<file path=ppt/slides/slide9.xml><?xml version="1.0" encoding="utf-8"?>
+<p:sld xmlns:a="http://schemas.openxmlformats.org/drawingml/2006/main" xmlns:r="http://schemas.openxmlformats.org/officeDocument/2006/relationships" xmlns:p="http://schemas.openxmlformats.org/presentationml/2006/main">
+  <p:cSld>
+    <p:spTree>
+      <p:nvGrpSpPr>
+        <p:cNvPr id="1" name=""/>
+        <p:cNvGrpSpPr/>
+        <p:nvPr/>
+      </p:nvGrpSpPr>
+      <p:grpSpPr>
+        <a:xfrm>
+          <a:off x="0" y="0"/>
+          <a:ext cx="0" cy="0"/>
+          <a:chOff x="0" y="0"/>
+          <a:chExt cx="0" cy="0"/>
+        </a:xfrm>
+      </p:grpSpPr>
+      <p:sp>
+        <p:nvSpPr>
+          <p:cNvPr id="2" name="Título 1">
+            <a:extLst>
+              <a:ext uri="{FF2B5EF4-FFF2-40B4-BE49-F238E27FC236}">
+                <a16:creationId xmlns:a16="http://schemas.microsoft.com/office/drawing/2014/main" id="{2A8EAD1E-807D-F7AC-1299-E225FB374172}"/>
+              </a:ext>
+            </a:extLst>
+          </p:cNvPr>
+          <p:cNvSpPr>
+            <a:spLocks noGrp="1"/>
+          </p:cNvSpPr>
+          <p:nvPr>
+            <p:ph type="title"/>
+          </p:nvPr>
+        </p:nvSpPr>
+        <p:spPr/>
+        <p:txBody>
+          <a:bodyPr/>
+          <a:lstStyle/>
+          <a:p>
+            <a:r>
+              <a:rPr lang="en-GB" b="1" dirty="0"/>
+              <a:t>Evaluation Strategy</a:t>
+            </a:r>
+          </a:p>
+        </p:txBody>
+      </p:sp>
+      <p:sp>
+        <p:nvSpPr>
+          <p:cNvPr id="3" name="Marcador de texto 2">
+            <a:extLst>
+              <a:ext uri="{FF2B5EF4-FFF2-40B4-BE49-F238E27FC236}">
+                <a16:creationId xmlns:a16="http://schemas.microsoft.com/office/drawing/2014/main" id="{5C461081-B566-CA00-3287-9C6D1B1AC786}"/>
+              </a:ext>
+            </a:extLst>
+          </p:cNvPr>
+          <p:cNvSpPr>
+            <a:spLocks noGrp="1"/>
+          </p:cNvSpPr>
+          <p:nvPr>
+            <p:ph type="body" idx="1"/>
+          </p:nvPr>
+        </p:nvSpPr>
+        <p:spPr/>
+        <p:txBody>
+          <a:bodyPr/>
+          <a:lstStyle/>
+          <a:p>
+            <a:r>
+              <a:rPr lang="en-GB" dirty="0"/>
+              <a:t>Time-Based Evaluation </a:t>
+            </a:r>
+          </a:p>
+        </p:txBody>
+      </p:sp>
+      <p:sp>
+        <p:nvSpPr>
+          <p:cNvPr id="4" name="Marcador de contenido 3">
+            <a:extLst>
+              <a:ext uri="{FF2B5EF4-FFF2-40B4-BE49-F238E27FC236}">
+                <a16:creationId xmlns:a16="http://schemas.microsoft.com/office/drawing/2014/main" id="{E781A080-DD99-DEEB-E568-E981F2A9425A}"/>
+              </a:ext>
+            </a:extLst>
+          </p:cNvPr>
+          <p:cNvSpPr>
+            <a:spLocks noGrp="1"/>
+          </p:cNvSpPr>
+          <p:nvPr>
+            <p:ph sz="half" idx="2"/>
+          </p:nvPr>
+        </p:nvSpPr>
+        <p:spPr/>
+        <p:txBody>
+          <a:bodyPr>
+            <a:normAutofit fontScale="85000" lnSpcReduction="20000"/>
+          </a:bodyPr>
+          <a:lstStyle/>
+          <a:p>
+            <a:r>
+              <a:rPr lang="en-GB" dirty="0"/>
+              <a:t>No shuffling (time series CV)</a:t>
+            </a:r>
+          </a:p>
+          <a:p>
+            <a:r>
+              <a:rPr lang="en-GB" dirty="0"/>
+              <a:t>Split:</a:t>
+            </a:r>
+          </a:p>
+          <a:p>
+            <a:pPr lvl="1"/>
+            <a:r>
+              <a:rPr lang="en-GB" dirty="0"/>
+              <a:t>Train </a:t>
+            </a:r>
+          </a:p>
+          <a:p>
+            <a:pPr lvl="1"/>
+            <a:r>
+              <a:rPr lang="en-GB" dirty="0"/>
+              <a:t>Validation (H = 31 days)</a:t>
+            </a:r>
+          </a:p>
+          <a:p>
+            <a:pPr lvl="1"/>
+            <a:r>
+              <a:rPr lang="en-GB" dirty="0"/>
+              <a:t>Test (H = 31 days)</a:t>
+            </a:r>
+          </a:p>
+          <a:p>
+            <a:r>
+              <a:rPr lang="en-GB" dirty="0"/>
+              <a:t>Metrics:</a:t>
+            </a:r>
+          </a:p>
+          <a:p>
+            <a:pPr lvl="1"/>
+            <a:r>
+              <a:rPr lang="en-GB" dirty="0"/>
+              <a:t>MAPE</a:t>
+            </a:r>
+          </a:p>
+          <a:p>
+            <a:pPr lvl="1"/>
+            <a:r>
+              <a:rPr lang="en-GB" dirty="0"/>
+              <a:t>MAE</a:t>
+            </a:r>
+          </a:p>
+          <a:p>
+            <a:pPr lvl="1"/>
+            <a:r>
+              <a:rPr lang="en-GB" dirty="0"/>
+              <a:t>RMSE</a:t>
+            </a:r>
+          </a:p>
+          <a:p>
+            <a:pPr lvl="1"/>
+            <a:r>
+              <a:rPr lang="en-GB" dirty="0"/>
+              <a:t>OPE</a:t>
+            </a:r>
+          </a:p>
+          <a:p>
+            <a:pPr lvl="1"/>
+            <a:r>
+              <a:rPr lang="en-GB" dirty="0"/>
+              <a:t>R2</a:t>
+            </a:r>
+          </a:p>
+        </p:txBody>
+      </p:sp>
+      <p:sp>
+        <p:nvSpPr>
+          <p:cNvPr id="5" name="Marcador de texto 4">
+            <a:extLst>
+              <a:ext uri="{FF2B5EF4-FFF2-40B4-BE49-F238E27FC236}">
+                <a16:creationId xmlns:a16="http://schemas.microsoft.com/office/drawing/2014/main" id="{3F28E473-FCCF-5323-3DF6-8E55FA8E65E3}"/>
+              </a:ext>
+            </a:extLst>
+          </p:cNvPr>
+          <p:cNvSpPr>
+            <a:spLocks noGrp="1"/>
+          </p:cNvSpPr>
+          <p:nvPr>
+            <p:ph type="body" sz="quarter" idx="3"/>
+          </p:nvPr>
+        </p:nvSpPr>
+        <p:spPr/>
+        <p:txBody>
+          <a:bodyPr/>
+          <a:lstStyle/>
+          <a:p>
+            <a:r>
+              <a:rPr lang="en-GB" dirty="0"/>
+              <a:t>Model Selection </a:t>
+            </a:r>
+          </a:p>
+        </p:txBody>
+      </p:sp>
+      <p:sp>
+        <p:nvSpPr>
+          <p:cNvPr id="6" name="Marcador de contenido 5">
+            <a:extLst>
+              <a:ext uri="{FF2B5EF4-FFF2-40B4-BE49-F238E27FC236}">
+                <a16:creationId xmlns:a16="http://schemas.microsoft.com/office/drawing/2014/main" id="{EF8FE6A7-C412-2D95-92DF-9D75CA5DE8F6}"/>
+              </a:ext>
+            </a:extLst>
+          </p:cNvPr>
+          <p:cNvSpPr>
+            <a:spLocks noGrp="1"/>
+          </p:cNvSpPr>
+          <p:nvPr>
+            <p:ph sz="quarter" idx="4"/>
+          </p:nvPr>
+        </p:nvSpPr>
+        <p:spPr/>
+        <p:txBody>
+          <a:bodyPr>
+            <a:normAutofit fontScale="85000" lnSpcReduction="20000"/>
+          </a:bodyPr>
+          <a:lstStyle/>
+          <a:p>
+            <a:r>
+              <a:rPr lang="en-GB" dirty="0"/>
+              <a:t>Best MAE on validation </a:t>
+            </a:r>
+          </a:p>
+          <a:p>
+            <a:r>
+              <a:rPr lang="en-GB" dirty="0"/>
+              <a:t>Baselines excluded from final forecast if unrealistic</a:t>
+            </a:r>
+          </a:p>
+        </p:txBody>
+      </p:sp>
+    </p:spTree>
+    <p:extLst>
+      <p:ext uri="{BB962C8B-B14F-4D97-AF65-F5344CB8AC3E}">
+        <p14:creationId xmlns:p14="http://schemas.microsoft.com/office/powerpoint/2010/main" val="84781556"/>
       </p:ext>
     </p:extLst>
   </p:cSld>

</xml_diff>

<commit_message>
Adding the provisional solution
</commit_message>
<xml_diff>
--- a/presentation/CapstonProject.pptx
+++ b/presentation/CapstonProject.pptx
@@ -271,7 +271,7 @@
           <a:p>
             <a:fld id="{DDBFD437-33C7-4B24-B6C7-F91A3EACF5E2}" type="datetimeFigureOut">
               <a:rPr lang="en-GB" smtClean="0"/>
-              <a:t>30/12/2025</a:t>
+              <a:t>31/12/2025</a:t>
             </a:fld>
             <a:endParaRPr lang="en-GB"/>
           </a:p>
@@ -471,7 +471,7 @@
           <a:p>
             <a:fld id="{DDBFD437-33C7-4B24-B6C7-F91A3EACF5E2}" type="datetimeFigureOut">
               <a:rPr lang="en-GB" smtClean="0"/>
-              <a:t>30/12/2025</a:t>
+              <a:t>31/12/2025</a:t>
             </a:fld>
             <a:endParaRPr lang="en-GB"/>
           </a:p>
@@ -681,7 +681,7 @@
           <a:p>
             <a:fld id="{DDBFD437-33C7-4B24-B6C7-F91A3EACF5E2}" type="datetimeFigureOut">
               <a:rPr lang="en-GB" smtClean="0"/>
-              <a:t>30/12/2025</a:t>
+              <a:t>31/12/2025</a:t>
             </a:fld>
             <a:endParaRPr lang="en-GB"/>
           </a:p>
@@ -881,7 +881,7 @@
           <a:p>
             <a:fld id="{DDBFD437-33C7-4B24-B6C7-F91A3EACF5E2}" type="datetimeFigureOut">
               <a:rPr lang="en-GB" smtClean="0"/>
-              <a:t>30/12/2025</a:t>
+              <a:t>31/12/2025</a:t>
             </a:fld>
             <a:endParaRPr lang="en-GB"/>
           </a:p>
@@ -1157,7 +1157,7 @@
           <a:p>
             <a:fld id="{DDBFD437-33C7-4B24-B6C7-F91A3EACF5E2}" type="datetimeFigureOut">
               <a:rPr lang="en-GB" smtClean="0"/>
-              <a:t>30/12/2025</a:t>
+              <a:t>31/12/2025</a:t>
             </a:fld>
             <a:endParaRPr lang="en-GB"/>
           </a:p>
@@ -1425,7 +1425,7 @@
           <a:p>
             <a:fld id="{DDBFD437-33C7-4B24-B6C7-F91A3EACF5E2}" type="datetimeFigureOut">
               <a:rPr lang="en-GB" smtClean="0"/>
-              <a:t>30/12/2025</a:t>
+              <a:t>31/12/2025</a:t>
             </a:fld>
             <a:endParaRPr lang="en-GB"/>
           </a:p>
@@ -1840,7 +1840,7 @@
           <a:p>
             <a:fld id="{DDBFD437-33C7-4B24-B6C7-F91A3EACF5E2}" type="datetimeFigureOut">
               <a:rPr lang="en-GB" smtClean="0"/>
-              <a:t>30/12/2025</a:t>
+              <a:t>31/12/2025</a:t>
             </a:fld>
             <a:endParaRPr lang="en-GB"/>
           </a:p>
@@ -1982,7 +1982,7 @@
           <a:p>
             <a:fld id="{DDBFD437-33C7-4B24-B6C7-F91A3EACF5E2}" type="datetimeFigureOut">
               <a:rPr lang="en-GB" smtClean="0"/>
-              <a:t>30/12/2025</a:t>
+              <a:t>31/12/2025</a:t>
             </a:fld>
             <a:endParaRPr lang="en-GB"/>
           </a:p>
@@ -2095,7 +2095,7 @@
           <a:p>
             <a:fld id="{DDBFD437-33C7-4B24-B6C7-F91A3EACF5E2}" type="datetimeFigureOut">
               <a:rPr lang="en-GB" smtClean="0"/>
-              <a:t>30/12/2025</a:t>
+              <a:t>31/12/2025</a:t>
             </a:fld>
             <a:endParaRPr lang="en-GB"/>
           </a:p>
@@ -2408,7 +2408,7 @@
           <a:p>
             <a:fld id="{DDBFD437-33C7-4B24-B6C7-F91A3EACF5E2}" type="datetimeFigureOut">
               <a:rPr lang="en-GB" smtClean="0"/>
-              <a:t>30/12/2025</a:t>
+              <a:t>31/12/2025</a:t>
             </a:fld>
             <a:endParaRPr lang="en-GB"/>
           </a:p>
@@ -2697,7 +2697,7 @@
           <a:p>
             <a:fld id="{DDBFD437-33C7-4B24-B6C7-F91A3EACF5E2}" type="datetimeFigureOut">
               <a:rPr lang="en-GB" smtClean="0"/>
-              <a:t>30/12/2025</a:t>
+              <a:t>31/12/2025</a:t>
             </a:fld>
             <a:endParaRPr lang="en-GB"/>
           </a:p>
@@ -2940,7 +2940,7 @@
           <a:p>
             <a:fld id="{DDBFD437-33C7-4B24-B6C7-F91A3EACF5E2}" type="datetimeFigureOut">
               <a:rPr lang="en-GB" smtClean="0"/>
-              <a:t>30/12/2025</a:t>
+              <a:t>31/12/2025</a:t>
             </a:fld>
             <a:endParaRPr lang="en-GB"/>
           </a:p>
@@ -3759,7 +3759,7 @@
           <a:p>
             <a:r>
               <a:rPr lang="en-GB" dirty="0"/>
-              <a:t>Team &amp; Contributions. REVISAR LO DE CADA UNO </a:t>
+              <a:t>Team &amp; Contributions. </a:t>
             </a:r>
           </a:p>
         </p:txBody>
@@ -3794,109 +3794,115 @@
             <a:pPr lvl="1"/>
             <a:r>
               <a:rPr lang="en-GB" dirty="0"/>
-              <a:t>Main Coding</a:t>
+              <a:t>Data parsing/cleaning</a:t>
             </a:r>
           </a:p>
           <a:p>
             <a:pPr lvl="1"/>
             <a:r>
               <a:rPr lang="en-GB" dirty="0"/>
-              <a:t>Data parsing/cleaning</a:t>
+              <a:t>Modelling </a:t>
             </a:r>
           </a:p>
           <a:p>
             <a:pPr lvl="1"/>
             <a:r>
               <a:rPr lang="en-GB" dirty="0"/>
-              <a:t>Modelling </a:t>
+              <a:t>Evaluation </a:t>
             </a:r>
           </a:p>
           <a:p>
             <a:pPr lvl="1"/>
             <a:r>
               <a:rPr lang="en-GB" dirty="0"/>
-              <a:t>Evaluation </a:t>
+              <a:t>Plots</a:t>
             </a:r>
           </a:p>
           <a:p>
             <a:pPr lvl="1"/>
             <a:r>
               <a:rPr lang="en-GB" dirty="0"/>
+              <a:t>Business value</a:t>
+            </a:r>
+          </a:p>
+          <a:p>
+            <a:pPr lvl="1"/>
+            <a:endParaRPr lang="en-GB" dirty="0"/>
+          </a:p>
+          <a:p>
+            <a:pPr marL="0" indent="0">
+              <a:buNone/>
+            </a:pPr>
+            <a:endParaRPr lang="en-GB" dirty="0"/>
+          </a:p>
+        </p:txBody>
+      </p:sp>
+      <p:sp>
+        <p:nvSpPr>
+          <p:cNvPr id="4" name="Marcador de contenido 3">
+            <a:extLst>
+              <a:ext uri="{FF2B5EF4-FFF2-40B4-BE49-F238E27FC236}">
+                <a16:creationId xmlns:a16="http://schemas.microsoft.com/office/drawing/2014/main" id="{9CD08206-EE7A-3E02-0120-39AE8E2E9062}"/>
+              </a:ext>
+            </a:extLst>
+          </p:cNvPr>
+          <p:cNvSpPr>
+            <a:spLocks noGrp="1"/>
+          </p:cNvSpPr>
+          <p:nvPr>
+            <p:ph sz="half" idx="2"/>
+          </p:nvPr>
+        </p:nvSpPr>
+        <p:spPr/>
+        <p:txBody>
+          <a:bodyPr/>
+          <a:lstStyle/>
+          <a:p>
+            <a:r>
+              <a:rPr lang="en-GB" dirty="0"/>
+              <a:t>Mireia Montoya:</a:t>
+            </a:r>
+          </a:p>
+          <a:p>
+            <a:pPr lvl="1"/>
+            <a:r>
+              <a:rPr lang="en-GB" dirty="0"/>
+              <a:t>Documentation </a:t>
+            </a:r>
+          </a:p>
+          <a:p>
+            <a:pPr lvl="1"/>
+            <a:r>
+              <a:rPr lang="en-GB" dirty="0"/>
+              <a:t>Slide deck</a:t>
+            </a:r>
+          </a:p>
+          <a:p>
+            <a:pPr lvl="1"/>
+            <a:r>
+              <a:rPr lang="en-GB" dirty="0"/>
+              <a:t>Interpretation of results</a:t>
+            </a:r>
+          </a:p>
+          <a:p>
+            <a:pPr lvl="1"/>
+            <a:r>
+              <a:rPr lang="en-GB" dirty="0"/>
+              <a:t>Presentation speaking roles</a:t>
+            </a:r>
+          </a:p>
+          <a:p>
+            <a:pPr lvl="1"/>
+            <a:r>
+              <a:rPr lang="en-GB" dirty="0"/>
               <a:t>Plots</a:t>
             </a:r>
           </a:p>
           <a:p>
-            <a:pPr lvl="1"/>
-            <a:r>
-              <a:rPr lang="en-GB" dirty="0"/>
-              <a:t>Final </a:t>
-            </a:r>
-          </a:p>
-          <a:p>
+            <a:pPr marL="457200" lvl="1" indent="0">
+              <a:buNone/>
+            </a:pPr>
             <a:endParaRPr lang="en-GB" dirty="0"/>
-          </a:p>
-        </p:txBody>
-      </p:sp>
-      <p:sp>
-        <p:nvSpPr>
-          <p:cNvPr id="4" name="Marcador de contenido 3">
-            <a:extLst>
-              <a:ext uri="{FF2B5EF4-FFF2-40B4-BE49-F238E27FC236}">
-                <a16:creationId xmlns:a16="http://schemas.microsoft.com/office/drawing/2014/main" id="{9CD08206-EE7A-3E02-0120-39AE8E2E9062}"/>
-              </a:ext>
-            </a:extLst>
-          </p:cNvPr>
-          <p:cNvSpPr>
-            <a:spLocks noGrp="1"/>
-          </p:cNvSpPr>
-          <p:nvPr>
-            <p:ph sz="half" idx="2"/>
-          </p:nvPr>
-        </p:nvSpPr>
-        <p:spPr/>
-        <p:txBody>
-          <a:bodyPr/>
-          <a:lstStyle/>
-          <a:p>
-            <a:r>
-              <a:rPr lang="en-GB" dirty="0"/>
-              <a:t>Mireia Montoya:</a:t>
-            </a:r>
-          </a:p>
-          <a:p>
-            <a:pPr lvl="1"/>
-            <a:r>
-              <a:rPr lang="en-GB" dirty="0"/>
-              <a:t>Documentation support </a:t>
-            </a:r>
-          </a:p>
-          <a:p>
-            <a:pPr lvl="1"/>
-            <a:r>
-              <a:rPr lang="en-GB" dirty="0"/>
-              <a:t>Slide deck</a:t>
-            </a:r>
-          </a:p>
-          <a:p>
-            <a:pPr lvl="1"/>
-            <a:r>
-              <a:rPr lang="en-GB" dirty="0"/>
-              <a:t>Interpretation of results</a:t>
-            </a:r>
-          </a:p>
-          <a:p>
-            <a:pPr lvl="1"/>
-            <a:r>
-              <a:rPr lang="en-GB" dirty="0"/>
-              <a:t>Business value</a:t>
-            </a:r>
-          </a:p>
-          <a:p>
-            <a:pPr lvl="1"/>
-            <a:r>
-              <a:rPr lang="en-GB" dirty="0"/>
-              <a:t>Presentation speaking roles</a:t>
-            </a:r>
           </a:p>
         </p:txBody>
       </p:sp>
@@ -4046,15 +4052,8 @@
             </a:r>
             <a:r>
               <a:rPr lang="en-GB" dirty="0"/>
-              <a:t>Forecast daily electricity generation for Spain by production technology for January 2026. CAMBIAR</a:t>
-            </a:r>
-          </a:p>
-          <a:p>
-            <a:pPr marL="285750" indent="-285750">
-              <a:buFont typeface="Arial" panose="020B0604020202020204" pitchFamily="34" charset="0"/>
-              <a:buChar char="•"/>
-            </a:pPr>
-            <a:endParaRPr lang="en-GB" dirty="0"/>
+              <a:t>Forecast daily electricity generation for Spain by production technology for January 2026. </a:t>
+            </a:r>
           </a:p>
           <a:p>
             <a:pPr marL="285750" indent="-285750">
@@ -4313,7 +4312,7 @@
           <a:p>
             <a:r>
               <a:rPr lang="en-GB" b="1" dirty="0"/>
-              <a:t>Solution Overview (CRISP-DM style). REISAR</a:t>
+              <a:t>Solution Overview </a:t>
             </a:r>
           </a:p>
         </p:txBody>
@@ -4449,7 +4448,7 @@
             </a:pPr>
             <a:r>
               <a:rPr lang="en-GB" b="1" dirty="0"/>
-              <a:t>7. Deployment output: </a:t>
+              <a:t>7. Output: </a:t>
             </a:r>
             <a:r>
               <a:rPr lang="en-GB" dirty="0"/>
@@ -5204,7 +5203,7 @@
           <a:p>
             <a:r>
               <a:rPr lang="en-GB" dirty="0"/>
-              <a:t>Baselines excluded from final forecast if unrealistic</a:t>
+              <a:t>Baselines excluded from final forecast</a:t>
             </a:r>
           </a:p>
         </p:txBody>

</xml_diff>